<commit_message>
Implement a new runner
</commit_message>
<xml_diff>
--- a/src/site/docs/ThePipeline.pptx
+++ b/src/site/docs/ThePipeline.pptx
@@ -3595,11 +3595,7 @@
               <a:pPr algn="ctr"/>
               <a:r>
                 <a:rPr lang="en-US" sz="1200" b="1" u="sng" dirty="0" smtClean="0"/>
-                <a:t>Parameters and </a:t>
-              </a:r>
-              <a:r>
-                <a:rPr lang="en-US" sz="1200" b="1" u="sng" dirty="0" smtClean="0"/>
-                <a:t>constraints</a:t>
+                <a:t>Parameters and constraints</a:t>
               </a:r>
               <a:endParaRPr lang="en-US" sz="1200" b="1" u="sng" dirty="0"/>
             </a:p>
@@ -4131,11 +4127,7 @@
             <a:pPr algn="ctr"/>
             <a:r>
               <a:rPr lang="en-US" sz="1200" dirty="0" smtClean="0"/>
-              <a:t>Parameters and </a:t>
-            </a:r>
-            <a:r>
-              <a:rPr lang="en-US" sz="1200" dirty="0" smtClean="0"/>
-              <a:t>constraints</a:t>
+              <a:t>Parameters and constraints</a:t>
             </a:r>
             <a:endParaRPr lang="en-US" sz="1200" dirty="0"/>
           </a:p>
@@ -4476,11 +4468,7 @@
               <a:pPr algn="ctr"/>
               <a:r>
                 <a:rPr lang="en-US" sz="1200" dirty="0" smtClean="0"/>
-                <a:t>Parameters and </a:t>
-              </a:r>
-              <a:r>
-                <a:rPr lang="en-US" sz="1200" dirty="0" smtClean="0"/>
-                <a:t>constraints</a:t>
+                <a:t>Parameters and constraints</a:t>
               </a:r>
               <a:endParaRPr lang="en-US" sz="1200" dirty="0"/>
             </a:p>
@@ -4916,11 +4904,7 @@
             <a:pPr algn="ctr"/>
             <a:r>
               <a:rPr lang="en-US" sz="1200" dirty="0" smtClean="0"/>
-              <a:t>Decoded Covering </a:t>
-            </a:r>
-            <a:r>
-              <a:rPr lang="en-US" sz="1200" dirty="0" smtClean="0"/>
-              <a:t>Array</a:t>
+              <a:t>Decoded Covering Array</a:t>
             </a:r>
             <a:endParaRPr lang="en-US" sz="1200" dirty="0"/>
           </a:p>
@@ -5284,11 +5268,7 @@
               <a:pPr algn="ctr"/>
               <a:r>
                 <a:rPr lang="en-US" sz="1200" dirty="0" smtClean="0"/>
-                <a:t>Parameters and </a:t>
-              </a:r>
-              <a:r>
-                <a:rPr lang="en-US" sz="1200" dirty="0" smtClean="0"/>
-                <a:t>constraints</a:t>
+                <a:t>Parameters and constraints</a:t>
               </a:r>
               <a:endParaRPr lang="en-US" sz="1200" dirty="0"/>
             </a:p>
@@ -5830,11 +5810,7 @@
             <a:pPr algn="ctr"/>
             <a:r>
               <a:rPr lang="en-US" sz="1200" dirty="0" smtClean="0"/>
-              <a:t>Decoded Covering </a:t>
-            </a:r>
-            <a:r>
-              <a:rPr lang="en-US" sz="1200" dirty="0" smtClean="0"/>
-              <a:t>Array</a:t>
+              <a:t>Decoded Covering Array</a:t>
             </a:r>
             <a:endParaRPr lang="en-US" sz="1200" dirty="0"/>
           </a:p>
@@ -5997,11 +5973,7 @@
             <a:pPr algn="ctr"/>
             <a:r>
               <a:rPr lang="en-US" sz="1200" dirty="0" smtClean="0"/>
-              <a:t>Parameters and </a:t>
-            </a:r>
-            <a:r>
-              <a:rPr lang="en-US" sz="1200" dirty="0" smtClean="0"/>
-              <a:t>constraints</a:t>
+              <a:t>Parameters and constraints</a:t>
             </a:r>
             <a:endParaRPr lang="en-US" sz="1200" dirty="0"/>
           </a:p>
@@ -6826,11 +6798,7 @@
             <a:pPr algn="ctr"/>
             <a:r>
               <a:rPr lang="en-US" sz="1200" dirty="0" smtClean="0"/>
-              <a:t>Decoded Covering </a:t>
-            </a:r>
-            <a:r>
-              <a:rPr lang="en-US" sz="1200" dirty="0" smtClean="0"/>
-              <a:t>Array</a:t>
+              <a:t>Decoded Covering Array</a:t>
             </a:r>
             <a:endParaRPr lang="en-US" sz="1200" dirty="0"/>
           </a:p>
@@ -6909,11 +6877,7 @@
             <a:pPr algn="ctr"/>
             <a:r>
               <a:rPr lang="en-US" sz="1200" dirty="0" smtClean="0"/>
-              <a:t>Decoded Covering </a:t>
-            </a:r>
-            <a:r>
-              <a:rPr lang="en-US" sz="1200" dirty="0" smtClean="0"/>
-              <a:t>Array</a:t>
+              <a:t>Decoded Covering Array</a:t>
             </a:r>
             <a:endParaRPr lang="en-US" sz="1200" dirty="0"/>
           </a:p>
@@ -8492,11 +8456,7 @@
             <a:pPr algn="ctr"/>
             <a:r>
               <a:rPr lang="en-US" sz="1200" dirty="0" smtClean="0"/>
-              <a:t>Covering </a:t>
-            </a:r>
-            <a:r>
-              <a:rPr lang="en-US" sz="1200" dirty="0" smtClean="0"/>
-              <a:t>Array</a:t>
+              <a:t>Covering Array</a:t>
             </a:r>
             <a:endParaRPr lang="en-US" sz="1200" dirty="0"/>
           </a:p>
@@ -8538,11 +8498,7 @@
             <a:pPr algn="ctr"/>
             <a:r>
               <a:rPr lang="en-US" sz="1200" dirty="0" smtClean="0"/>
-              <a:t>Covering </a:t>
-            </a:r>
-            <a:r>
-              <a:rPr lang="en-US" sz="1200" dirty="0" smtClean="0"/>
-              <a:t>Array</a:t>
+              <a:t>Covering Array</a:t>
             </a:r>
             <a:endParaRPr lang="en-US" sz="1200" dirty="0"/>
           </a:p>
@@ -8584,11 +8540,7 @@
             <a:pPr algn="ctr"/>
             <a:r>
               <a:rPr lang="en-US" sz="1200" dirty="0" smtClean="0"/>
-              <a:t>Covering </a:t>
-            </a:r>
-            <a:r>
-              <a:rPr lang="en-US" sz="1200" dirty="0" smtClean="0"/>
-              <a:t>Array</a:t>
+              <a:t>Covering Array</a:t>
             </a:r>
             <a:endParaRPr lang="en-US" sz="1200" dirty="0"/>
           </a:p>
@@ -8630,11 +8582,7 @@
             <a:pPr algn="ctr"/>
             <a:r>
               <a:rPr lang="en-US" sz="1200" dirty="0" smtClean="0"/>
-              <a:t>Covering </a:t>
-            </a:r>
-            <a:r>
-              <a:rPr lang="en-US" sz="1200" dirty="0" smtClean="0"/>
-              <a:t>Array</a:t>
+              <a:t>Covering Array</a:t>
             </a:r>
             <a:endParaRPr lang="en-US" sz="1200" dirty="0"/>
           </a:p>
@@ -9511,11 +9459,7 @@
             <a:pPr algn="ctr"/>
             <a:r>
               <a:rPr lang="en-US" sz="1200" dirty="0" smtClean="0"/>
-              <a:t>Covering </a:t>
-            </a:r>
-            <a:r>
-              <a:rPr lang="en-US" sz="1200" dirty="0" smtClean="0"/>
-              <a:t>Array</a:t>
+              <a:t>Covering Array</a:t>
             </a:r>
             <a:endParaRPr lang="en-US" sz="1200" dirty="0"/>
           </a:p>
@@ -9571,11 +9515,7 @@
               <a:pPr algn="ctr"/>
               <a:r>
                 <a:rPr lang="en-US" sz="1200" dirty="0" smtClean="0"/>
-                <a:t>Parameters and </a:t>
-              </a:r>
-              <a:r>
-                <a:rPr lang="en-US" sz="1200" dirty="0" smtClean="0"/>
-                <a:t>constraints</a:t>
+                <a:t>Parameters and constraints</a:t>
               </a:r>
               <a:endParaRPr lang="en-US" sz="1200" dirty="0"/>
             </a:p>
@@ -10293,11 +10233,7 @@
             <a:pPr algn="ctr"/>
             <a:r>
               <a:rPr lang="en-US" sz="1200" dirty="0" smtClean="0"/>
-              <a:t>Decoded Covering </a:t>
-            </a:r>
-            <a:r>
-              <a:rPr lang="en-US" sz="1200" dirty="0" smtClean="0"/>
-              <a:t>Array</a:t>
+              <a:t>Decoded Covering Array</a:t>
             </a:r>
             <a:endParaRPr lang="en-US" sz="1200" dirty="0"/>
           </a:p>
@@ -10431,8 +10367,8 @@
         </p:nvCxnSpPr>
         <p:spPr>
           <a:xfrm flipH="1">
-            <a:off x="6050941" y="2878401"/>
-            <a:ext cx="640312" cy="2084494"/>
+            <a:off x="6050941" y="3599826"/>
+            <a:ext cx="722744" cy="1363069"/>
           </a:xfrm>
           <a:prstGeom prst="line">
             <a:avLst/>
@@ -10464,7 +10400,7 @@
         </p:nvGrpSpPr>
         <p:grpSpPr>
           <a:xfrm>
-            <a:off x="4909054" y="2237824"/>
+            <a:off x="4991486" y="2959249"/>
             <a:ext cx="1866514" cy="686550"/>
             <a:chOff x="4909054" y="2099075"/>
             <a:chExt cx="1866514" cy="686550"/>

</xml_diff>